<commit_message>
Updated heater box diagram
</commit_message>
<xml_diff>
--- a/Mechanical Design/Hole Diagram Heater Box.pptx
+++ b/Mechanical Design/Hole Diagram Heater Box.pptx
@@ -104,6 +104,11 @@
       </a:defRPr>
     </a:lvl9pPr>
   </p:defaultTextStyle>
+  <p:extLst>
+    <p:ext uri="{EFAFB233-063F-42B5-8137-9DF3F51BA10A}">
+      <p15:sldGuideLst xmlns:p15="http://schemas.microsoft.com/office/powerpoint/2012/main"/>
+    </p:ext>
+  </p:extLst>
 </p:presentation>
 </file>
 
@@ -3036,7 +3041,7 @@
         </p:nvSpPr>
         <p:spPr>
           <a:xfrm>
-            <a:off x="5875379" y="4278437"/>
+            <a:off x="5892797" y="4278437"/>
             <a:ext cx="144000" cy="144000"/>
           </a:xfrm>
           <a:prstGeom prst="ellipse">
@@ -3090,7 +3095,7 @@
         </p:nvSpPr>
         <p:spPr>
           <a:xfrm>
-            <a:off x="2987745" y="2607048"/>
+            <a:off x="3005163" y="2607048"/>
             <a:ext cx="144000" cy="144000"/>
           </a:xfrm>
           <a:prstGeom prst="ellipse">
@@ -3144,7 +3149,7 @@
         </p:nvSpPr>
         <p:spPr>
           <a:xfrm>
-            <a:off x="4146172" y="4278437"/>
+            <a:off x="4128754" y="4278437"/>
             <a:ext cx="144000" cy="144000"/>
           </a:xfrm>
           <a:prstGeom prst="ellipse">
@@ -3198,7 +3203,7 @@
         </p:nvSpPr>
         <p:spPr>
           <a:xfrm>
-            <a:off x="2989333" y="4278437"/>
+            <a:off x="3006751" y="4278437"/>
             <a:ext cx="144000" cy="144000"/>
           </a:xfrm>
           <a:prstGeom prst="ellipse">
@@ -3252,7 +3257,7 @@
         </p:nvSpPr>
         <p:spPr>
           <a:xfrm>
-            <a:off x="7027723" y="2605545"/>
+            <a:off x="7010305" y="2605545"/>
             <a:ext cx="144000" cy="144000"/>
           </a:xfrm>
           <a:prstGeom prst="ellipse">
@@ -3306,7 +3311,7 @@
         </p:nvSpPr>
         <p:spPr>
           <a:xfrm>
-            <a:off x="5871286" y="2605545"/>
+            <a:off x="5888704" y="2605545"/>
             <a:ext cx="144000" cy="144000"/>
           </a:xfrm>
           <a:prstGeom prst="ellipse">
@@ -3360,7 +3365,7 @@
         </p:nvSpPr>
         <p:spPr>
           <a:xfrm>
-            <a:off x="7027723" y="4278437"/>
+            <a:off x="7010305" y="4278437"/>
             <a:ext cx="144000" cy="144000"/>
           </a:xfrm>
           <a:prstGeom prst="ellipse">
@@ -3414,7 +3419,7 @@
         </p:nvSpPr>
         <p:spPr>
           <a:xfrm>
-            <a:off x="4147760" y="2605545"/>
+            <a:off x="4130342" y="2605545"/>
             <a:ext cx="144000" cy="144000"/>
           </a:xfrm>
           <a:prstGeom prst="ellipse">

</xml_diff>